<commit_message>
add employee review data
</commit_message>
<xml_diff>
--- a/lessons/Feb6/Class1C_PreProcessing_TermFreq.pptx
+++ b/lessons/Feb6/Class1C_PreProcessing_TermFreq.pptx
@@ -232,7 +232,7 @@
           <a:p>
             <a:fld id="{B0C0A60C-850A-4EA4-9C14-A8FE98B94505}" type="datetimeFigureOut">
               <a:rPr lang="en-US" smtClean="0"/>
-              <a:t>1/29/23</a:t>
+              <a:t>2/6/23</a:t>
             </a:fld>
             <a:endParaRPr lang="en-US"/>
           </a:p>
@@ -631,7 +631,7 @@
           <a:p>
             <a:fld id="{5738B90E-0779-4C36-915C-6F05FCD89456}" type="datetime1">
               <a:rPr lang="en-US" smtClean="0"/>
-              <a:t>1/29/23</a:t>
+              <a:t>2/6/23</a:t>
             </a:fld>
             <a:endParaRPr lang="en-US"/>
           </a:p>
@@ -811,7 +811,7 @@
           <a:p>
             <a:fld id="{7B9EA29D-D431-42FE-B7B6-AAE4454C77D3}" type="datetime1">
               <a:rPr lang="en-US" smtClean="0"/>
-              <a:t>1/29/23</a:t>
+              <a:t>2/6/23</a:t>
             </a:fld>
             <a:endParaRPr lang="en-US"/>
           </a:p>
@@ -1068,7 +1068,7 @@
           <a:p>
             <a:fld id="{690D8A1E-EA8F-46C1-B891-AE0C00D9C314}" type="datetime1">
               <a:rPr lang="en-US" smtClean="0"/>
-              <a:t>1/29/23</a:t>
+              <a:t>2/6/23</a:t>
             </a:fld>
             <a:endParaRPr lang="en-US"/>
           </a:p>
@@ -1359,7 +1359,7 @@
           <a:p>
             <a:fld id="{D753EFC8-4232-4598-94F6-94C0EBAFC469}" type="datetime1">
               <a:rPr lang="en-US" smtClean="0"/>
-              <a:t>1/29/23</a:t>
+              <a:t>2/6/23</a:t>
             </a:fld>
             <a:endParaRPr lang="en-US"/>
           </a:p>
@@ -1671,7 +1671,7 @@
           <a:p>
             <a:fld id="{F3161074-1C18-4AE7-957D-F18524378C85}" type="datetime1">
               <a:rPr lang="en-US" smtClean="0"/>
-              <a:t>1/29/23</a:t>
+              <a:t>2/6/23</a:t>
             </a:fld>
             <a:endParaRPr lang="en-US"/>
           </a:p>
@@ -1907,7 +1907,7 @@
           <a:p>
             <a:fld id="{69BE256C-8D9A-4404-B47D-41A1AE514425}" type="datetime1">
               <a:rPr lang="en-US" smtClean="0"/>
-              <a:t>1/29/23</a:t>
+              <a:t>2/6/23</a:t>
             </a:fld>
             <a:endParaRPr lang="en-US"/>
           </a:p>
@@ -2338,7 +2338,7 @@
           <a:p>
             <a:fld id="{66CB2154-9035-4012-8189-BAAB61C5A5EE}" type="datetime1">
               <a:rPr lang="en-US" smtClean="0"/>
-              <a:t>1/29/23</a:t>
+              <a:t>2/6/23</a:t>
             </a:fld>
             <a:endParaRPr lang="en-US"/>
           </a:p>
@@ -2509,7 +2509,7 @@
           <a:p>
             <a:fld id="{6700A58B-DD98-43D0-B791-721480A02982}" type="datetime1">
               <a:rPr lang="en-US" smtClean="0"/>
-              <a:t>1/29/23</a:t>
+              <a:t>2/6/23</a:t>
             </a:fld>
             <a:endParaRPr lang="en-US"/>
           </a:p>
@@ -2698,7 +2698,7 @@
           <a:p>
             <a:fld id="{7DB6E382-4F61-4E24-BE1A-377EC83D0E3A}" type="datetime1">
               <a:rPr lang="en-US" smtClean="0"/>
-              <a:t>1/29/23</a:t>
+              <a:t>2/6/23</a:t>
             </a:fld>
             <a:endParaRPr lang="en-US"/>
           </a:p>
@@ -3006,7 +3006,7 @@
           <a:p>
             <a:fld id="{4142EED6-FC16-45B9-B8C4-2BC5DBA88325}" type="datetime1">
               <a:rPr lang="en-US" smtClean="0"/>
-              <a:t>1/29/23</a:t>
+              <a:t>2/6/23</a:t>
             </a:fld>
             <a:endParaRPr lang="en-US"/>
           </a:p>
@@ -3321,7 +3321,7 @@
           <a:p>
             <a:fld id="{DF59512B-4F1D-43D7-8819-2F53FEF69650}" type="datetime1">
               <a:rPr lang="en-US" smtClean="0"/>
-              <a:t>1/29/23</a:t>
+              <a:t>2/6/23</a:t>
             </a:fld>
             <a:endParaRPr lang="en-US"/>
           </a:p>
@@ -3594,7 +3594,7 @@
           <a:p>
             <a:fld id="{08437B94-E2BF-44DC-ADC5-B05FC9934E9D}" type="datetime1">
               <a:rPr lang="en-US" smtClean="0"/>
-              <a:t>1/29/23</a:t>
+              <a:t>2/6/23</a:t>
             </a:fld>
             <a:endParaRPr lang="en-US"/>
           </a:p>
@@ -4027,7 +4027,7 @@
           <a:p>
             <a:fld id="{6700A58B-DD98-43D0-B791-721480A02982}" type="datetime1">
               <a:rPr lang="en-US" smtClean="0"/>
-              <a:t>1/29/23</a:t>
+              <a:t>2/6/23</a:t>
             </a:fld>
             <a:endParaRPr lang="en-US"/>
           </a:p>
@@ -4303,7 +4303,7 @@
           <a:p>
             <a:fld id="{6700A58B-DD98-43D0-B791-721480A02982}" type="datetime1">
               <a:rPr lang="en-US" smtClean="0"/>
-              <a:t>1/29/23</a:t>
+              <a:t>2/6/23</a:t>
             </a:fld>
             <a:endParaRPr lang="en-US"/>
           </a:p>
@@ -5158,7 +5158,7 @@
           <a:p>
             <a:fld id="{7DB6E382-4F61-4E24-BE1A-377EC83D0E3A}" type="datetime1">
               <a:rPr lang="en-US" smtClean="0"/>
-              <a:t>1/29/23</a:t>
+              <a:t>2/6/23</a:t>
             </a:fld>
             <a:endParaRPr lang="en-US"/>
           </a:p>
@@ -5770,7 +5770,7 @@
           <a:p>
             <a:fld id="{6700A58B-DD98-43D0-B791-721480A02982}" type="datetime1">
               <a:rPr lang="en-US" smtClean="0"/>
-              <a:t>1/29/23</a:t>
+              <a:t>2/6/23</a:t>
             </a:fld>
             <a:endParaRPr lang="en-US"/>
           </a:p>
@@ -6173,7 +6173,7 @@
           <a:p>
             <a:fld id="{6700A58B-DD98-43D0-B791-721480A02982}" type="datetime1">
               <a:rPr lang="en-US" smtClean="0"/>
-              <a:t>1/29/23</a:t>
+              <a:t>2/6/23</a:t>
             </a:fld>
             <a:endParaRPr lang="en-US"/>
           </a:p>
@@ -6796,7 +6796,7 @@
           <a:p>
             <a:fld id="{6700A58B-DD98-43D0-B791-721480A02982}" type="datetime1">
               <a:rPr lang="en-US" smtClean="0"/>
-              <a:t>1/29/23</a:t>
+              <a:t>2/6/23</a:t>
             </a:fld>
             <a:endParaRPr lang="en-US"/>
           </a:p>
@@ -8259,7 +8259,7 @@
           <a:p>
             <a:fld id="{6700A58B-DD98-43D0-B791-721480A02982}" type="datetime1">
               <a:rPr lang="en-US" smtClean="0"/>
-              <a:t>1/29/23</a:t>
+              <a:t>2/6/23</a:t>
             </a:fld>
             <a:endParaRPr lang="en-US"/>
           </a:p>
@@ -11199,7 +11199,7 @@
           <a:p>
             <a:fld id="{6700A58B-DD98-43D0-B791-721480A02982}" type="datetime1">
               <a:rPr lang="en-US" smtClean="0"/>
-              <a:t>1/29/23</a:t>
+              <a:t>2/6/23</a:t>
             </a:fld>
             <a:endParaRPr lang="en-US"/>
           </a:p>
@@ -12849,7 +12849,7 @@
           <a:p>
             <a:fld id="{6700A58B-DD98-43D0-B791-721480A02982}" type="datetime1">
               <a:rPr lang="en-US" smtClean="0"/>
-              <a:t>1/29/23</a:t>
+              <a:t>2/6/23</a:t>
             </a:fld>
             <a:endParaRPr lang="en-US"/>
           </a:p>
@@ -13353,7 +13353,7 @@
           <a:p>
             <a:fld id="{6700A58B-DD98-43D0-B791-721480A02982}" type="datetime1">
               <a:rPr lang="en-US" smtClean="0"/>
-              <a:t>1/29/23</a:t>
+              <a:t>2/6/23</a:t>
             </a:fld>
             <a:endParaRPr lang="en-US"/>
           </a:p>
@@ -13658,7 +13658,7 @@
           <p:nvPr>
             <p:extLst>
               <p:ext uri="{D42A27DB-BD31-4B8C-83A1-F6EECF244321}">
-                <p14:modId xmlns:p14="http://schemas.microsoft.com/office/powerpoint/2010/main" val="682674957"/>
+                <p14:modId xmlns:p14="http://schemas.microsoft.com/office/powerpoint/2010/main" val="3261317795"/>
               </p:ext>
             </p:extLst>
           </p:nvPr>
@@ -13754,7 +13754,7 @@
                         <a:rPr lang="en-US" dirty="0">
                           <a:latin typeface="Arial Unicode MS" panose="020B0604020202020204" pitchFamily="34" charset="-128"/>
                         </a:rPr>
-                        <a:t>0</a:t>
+                        <a:t>1</a:t>
                       </a:r>
                     </a:p>
                   </a:txBody>
@@ -13936,7 +13936,7 @@
           <p:nvPr>
             <p:extLst>
               <p:ext uri="{D42A27DB-BD31-4B8C-83A1-F6EECF244321}">
-                <p14:modId xmlns:p14="http://schemas.microsoft.com/office/powerpoint/2010/main" val="2179892506"/>
+                <p14:modId xmlns:p14="http://schemas.microsoft.com/office/powerpoint/2010/main" val="1016640961"/>
               </p:ext>
             </p:extLst>
           </p:nvPr>
@@ -14459,7 +14459,7 @@
                         <a:rPr lang="en-US" sz="1000" dirty="0">
                           <a:latin typeface="Arial Unicode MS" panose="020B0604020202020204" pitchFamily="34" charset="-128"/>
                         </a:rPr>
-                        <a:t>0</a:t>
+                        <a:t>1</a:t>
                       </a:r>
                     </a:p>
                   </a:txBody>
@@ -16720,7 +16720,7 @@
           <a:p>
             <a:fld id="{6700A58B-DD98-43D0-B791-721480A02982}" type="datetime1">
               <a:rPr lang="en-US" smtClean="0"/>
-              <a:t>1/29/23</a:t>
+              <a:t>2/6/23</a:t>
             </a:fld>
             <a:endParaRPr lang="en-US"/>
           </a:p>
@@ -17028,7 +17028,7 @@
           <p:nvPr>
             <p:extLst>
               <p:ext uri="{D42A27DB-BD31-4B8C-83A1-F6EECF244321}">
-                <p14:modId xmlns:p14="http://schemas.microsoft.com/office/powerpoint/2010/main" val="1795734090"/>
+                <p14:modId xmlns:p14="http://schemas.microsoft.com/office/powerpoint/2010/main" val="4132740880"/>
               </p:ext>
             </p:extLst>
           </p:nvPr>
@@ -17124,7 +17124,7 @@
                         <a:rPr lang="en-US" dirty="0">
                           <a:latin typeface="Arial Unicode MS" panose="020B0604020202020204" pitchFamily="34" charset="-128"/>
                         </a:rPr>
-                        <a:t>0</a:t>
+                        <a:t>1</a:t>
                       </a:r>
                     </a:p>
                   </a:txBody>
@@ -17366,7 +17366,7 @@
           <p:nvPr>
             <p:extLst>
               <p:ext uri="{D42A27DB-BD31-4B8C-83A1-F6EECF244321}">
-                <p14:modId xmlns:p14="http://schemas.microsoft.com/office/powerpoint/2010/main" val="5829688"/>
+                <p14:modId xmlns:p14="http://schemas.microsoft.com/office/powerpoint/2010/main" val="4131593168"/>
               </p:ext>
             </p:extLst>
           </p:nvPr>
@@ -17805,7 +17805,7 @@
                         <a:rPr lang="en-US" sz="1000" dirty="0">
                           <a:latin typeface="Arial Unicode MS" panose="020B0604020202020204" pitchFamily="34" charset="-128"/>
                         </a:rPr>
-                        <a:t>0</a:t>
+                        <a:t>1</a:t>
                       </a:r>
                     </a:p>
                   </a:txBody>
@@ -18713,7 +18713,7 @@
           <a:p>
             <a:fld id="{6700A58B-DD98-43D0-B791-721480A02982}" type="datetime1">
               <a:rPr lang="en-US" smtClean="0"/>
-              <a:t>1/29/23</a:t>
+              <a:t>2/6/23</a:t>
             </a:fld>
             <a:endParaRPr lang="en-US"/>
           </a:p>
@@ -19505,7 +19505,7 @@
           <a:p>
             <a:fld id="{6700A58B-DD98-43D0-B791-721480A02982}" type="datetime1">
               <a:rPr lang="en-US" smtClean="0"/>
-              <a:t>1/29/23</a:t>
+              <a:t>2/6/23</a:t>
             </a:fld>
             <a:endParaRPr lang="en-US"/>
           </a:p>
@@ -20572,7 +20572,7 @@
             <a:fld id="{6700A58B-DD98-43D0-B791-721480A02982}" type="datetime1">
               <a:rPr lang="en-US" smtClean="0"/>
               <a:pPr/>
-              <a:t>1/29/23</a:t>
+              <a:t>2/6/23</a:t>
             </a:fld>
             <a:endParaRPr lang="en-US"/>
           </a:p>
@@ -22761,7 +22761,7 @@
             <a:fld id="{6700A58B-DD98-43D0-B791-721480A02982}" type="datetime1">
               <a:rPr lang="en-US" smtClean="0"/>
               <a:pPr/>
-              <a:t>1/29/23</a:t>
+              <a:t>2/6/23</a:t>
             </a:fld>
             <a:endParaRPr lang="en-US"/>
           </a:p>
@@ -25368,7 +25368,7 @@
             <a:fld id="{6700A58B-DD98-43D0-B791-721480A02982}" type="datetime1">
               <a:rPr lang="en-US" smtClean="0"/>
               <a:pPr/>
-              <a:t>1/29/23</a:t>
+              <a:t>2/6/23</a:t>
             </a:fld>
             <a:endParaRPr lang="en-US"/>
           </a:p>
@@ -26402,7 +26402,7 @@
             <a:fld id="{6700A58B-DD98-43D0-B791-721480A02982}" type="datetime1">
               <a:rPr lang="en-US" smtClean="0"/>
               <a:pPr/>
-              <a:t>1/29/23</a:t>
+              <a:t>2/6/23</a:t>
             </a:fld>
             <a:endParaRPr lang="en-US"/>
           </a:p>
@@ -27575,7 +27575,7 @@
             <a:fld id="{6700A58B-DD98-43D0-B791-721480A02982}" type="datetime1">
               <a:rPr lang="en-US" smtClean="0"/>
               <a:pPr/>
-              <a:t>1/29/23</a:t>
+              <a:t>2/6/23</a:t>
             </a:fld>
             <a:endParaRPr lang="en-US"/>
           </a:p>
@@ -28265,7 +28265,7 @@
           <a:p>
             <a:fld id="{6700A58B-DD98-43D0-B791-721480A02982}" type="datetime1">
               <a:rPr lang="en-US" smtClean="0"/>
-              <a:t>1/29/23</a:t>
+              <a:t>2/6/23</a:t>
             </a:fld>
             <a:endParaRPr lang="en-US"/>
           </a:p>

</xml_diff>